<commit_message>
first page result done
</commit_message>
<xml_diff>
--- a/GUI.pptx
+++ b/GUI.pptx
@@ -280,7 +280,7 @@
           <a:p>
             <a:fld id="{E1A5041F-47F4-4CCF-872D-C1C31578EE74}" type="datetimeFigureOut">
               <a:rPr lang="en-US" smtClean="0"/>
-              <a:t>6/1/2023</a:t>
+              <a:t>6/12/2023</a:t>
             </a:fld>
             <a:endParaRPr lang="en-US"/>
           </a:p>
@@ -478,7 +478,7 @@
           <a:p>
             <a:fld id="{E1A5041F-47F4-4CCF-872D-C1C31578EE74}" type="datetimeFigureOut">
               <a:rPr lang="en-US" smtClean="0"/>
-              <a:t>6/1/2023</a:t>
+              <a:t>6/12/2023</a:t>
             </a:fld>
             <a:endParaRPr lang="en-US"/>
           </a:p>
@@ -686,7 +686,7 @@
           <a:p>
             <a:fld id="{E1A5041F-47F4-4CCF-872D-C1C31578EE74}" type="datetimeFigureOut">
               <a:rPr lang="en-US" smtClean="0"/>
-              <a:t>6/1/2023</a:t>
+              <a:t>6/12/2023</a:t>
             </a:fld>
             <a:endParaRPr lang="en-US"/>
           </a:p>
@@ -884,7 +884,7 @@
           <a:p>
             <a:fld id="{E1A5041F-47F4-4CCF-872D-C1C31578EE74}" type="datetimeFigureOut">
               <a:rPr lang="en-US" smtClean="0"/>
-              <a:t>6/1/2023</a:t>
+              <a:t>6/12/2023</a:t>
             </a:fld>
             <a:endParaRPr lang="en-US"/>
           </a:p>
@@ -1159,7 +1159,7 @@
           <a:p>
             <a:fld id="{E1A5041F-47F4-4CCF-872D-C1C31578EE74}" type="datetimeFigureOut">
               <a:rPr lang="en-US" smtClean="0"/>
-              <a:t>6/1/2023</a:t>
+              <a:t>6/12/2023</a:t>
             </a:fld>
             <a:endParaRPr lang="en-US"/>
           </a:p>
@@ -1424,7 +1424,7 @@
           <a:p>
             <a:fld id="{E1A5041F-47F4-4CCF-872D-C1C31578EE74}" type="datetimeFigureOut">
               <a:rPr lang="en-US" smtClean="0"/>
-              <a:t>6/1/2023</a:t>
+              <a:t>6/12/2023</a:t>
             </a:fld>
             <a:endParaRPr lang="en-US"/>
           </a:p>
@@ -1836,7 +1836,7 @@
           <a:p>
             <a:fld id="{E1A5041F-47F4-4CCF-872D-C1C31578EE74}" type="datetimeFigureOut">
               <a:rPr lang="en-US" smtClean="0"/>
-              <a:t>6/1/2023</a:t>
+              <a:t>6/12/2023</a:t>
             </a:fld>
             <a:endParaRPr lang="en-US"/>
           </a:p>
@@ -1977,7 +1977,7 @@
           <a:p>
             <a:fld id="{E1A5041F-47F4-4CCF-872D-C1C31578EE74}" type="datetimeFigureOut">
               <a:rPr lang="en-US" smtClean="0"/>
-              <a:t>6/1/2023</a:t>
+              <a:t>6/12/2023</a:t>
             </a:fld>
             <a:endParaRPr lang="en-US"/>
           </a:p>
@@ -2090,7 +2090,7 @@
           <a:p>
             <a:fld id="{E1A5041F-47F4-4CCF-872D-C1C31578EE74}" type="datetimeFigureOut">
               <a:rPr lang="en-US" smtClean="0"/>
-              <a:t>6/1/2023</a:t>
+              <a:t>6/12/2023</a:t>
             </a:fld>
             <a:endParaRPr lang="en-US"/>
           </a:p>
@@ -2401,7 +2401,7 @@
           <a:p>
             <a:fld id="{E1A5041F-47F4-4CCF-872D-C1C31578EE74}" type="datetimeFigureOut">
               <a:rPr lang="en-US" smtClean="0"/>
-              <a:t>6/1/2023</a:t>
+              <a:t>6/12/2023</a:t>
             </a:fld>
             <a:endParaRPr lang="en-US"/>
           </a:p>
@@ -2689,7 +2689,7 @@
           <a:p>
             <a:fld id="{E1A5041F-47F4-4CCF-872D-C1C31578EE74}" type="datetimeFigureOut">
               <a:rPr lang="en-US" smtClean="0"/>
-              <a:t>6/1/2023</a:t>
+              <a:t>6/12/2023</a:t>
             </a:fld>
             <a:endParaRPr lang="en-US"/>
           </a:p>
@@ -2930,7 +2930,7 @@
           <a:p>
             <a:fld id="{E1A5041F-47F4-4CCF-872D-C1C31578EE74}" type="datetimeFigureOut">
               <a:rPr lang="en-US" smtClean="0"/>
-              <a:t>6/1/2023</a:t>
+              <a:t>6/12/2023</a:t>
             </a:fld>
             <a:endParaRPr lang="en-US"/>
           </a:p>

</xml_diff>